<commit_message>
Updated docs to describe updated interfaces.
</commit_message>
<xml_diff>
--- a/Doc/2023-CC-SummitTechnical-Final.pptx
+++ b/Doc/2023-CC-SummitTechnical-Final.pptx
@@ -262,7 +262,7 @@
       <p15:sldGuideLst xmlns:p15="http://schemas.microsoft.com/office/powerpoint/2012/main"/>
     </p:ext>
     <p:ext uri="GoogleSlidesCustomDataVersion2">
-      <go:slidesCustomData xmlns:mc="http://schemas.openxmlformats.org/markup-compatibility/2006" xmlns:mv="urn:schemas-microsoft-com:mac:vml" xmlns:c="http://schemas.openxmlformats.org/drawingml/2006/chart" xmlns:dgm="http://schemas.openxmlformats.org/drawingml/2006/diagram" xmlns:o="urn:schemas-microsoft-com:office:office" xmlns:v="urn:schemas-microsoft-com:vml" xmlns:pvml="urn:schemas-microsoft-com:office:powerpoint" xmlns:com="http://schemas.openxmlformats.org/drawingml/2006/compatibility" xmlns:p14="http://schemas.microsoft.com/office/powerpoint/2010/main" xmlns:p15="http://schemas.microsoft.com/office/powerpoint/2012/main" xmlns:ahyp="http://schemas.microsoft.com/office/drawing/2018/hyperlinkcolor" xmlns:go="http://customooxmlschemas.google.com/" xmlns="" r:id="rId29" roundtripDataSignature="AMtx7mjr6PLBXlQmuAYhHlEqEj54pF85GQ=="/>
+      <go:slidesCustomData xmlns="" xmlns:go="http://customooxmlschemas.google.com/" xmlns:ahyp="http://schemas.microsoft.com/office/drawing/2018/hyperlinkcolor" xmlns:p15="http://schemas.microsoft.com/office/powerpoint/2012/main" xmlns:p14="http://schemas.microsoft.com/office/powerpoint/2010/main" xmlns:com="http://schemas.openxmlformats.org/drawingml/2006/compatibility" xmlns:pvml="urn:schemas-microsoft-com:office:powerpoint" xmlns:v="urn:schemas-microsoft-com:vml" xmlns:o="urn:schemas-microsoft-com:office:office" xmlns:dgm="http://schemas.openxmlformats.org/drawingml/2006/diagram" xmlns:c="http://schemas.openxmlformats.org/drawingml/2006/chart" xmlns:mv="urn:schemas-microsoft-com:mac:vml" xmlns:mc="http://schemas.openxmlformats.org/markup-compatibility/2006" r:id="rId29" roundtripDataSignature="AMtx7mjr6PLBXlQmuAYhHlEqEj54pF85GQ=="/>
     </p:ext>
   </p:extLst>
 </p:presentation>
@@ -26904,7 +26904,7 @@
           <p:nvPr>
             <p:extLst>
               <p:ext uri="{D42A27DB-BD31-4B8C-83A1-F6EECF244321}">
-                <p14:modId xmlns:p14="http://schemas.microsoft.com/office/powerpoint/2010/main" val="2324344503"/>
+                <p14:modId xmlns:p14="http://schemas.microsoft.com/office/powerpoint/2010/main" val="1483176590"/>
               </p:ext>
             </p:extLst>
           </p:nvPr>
@@ -26942,14 +26942,24 @@
                     <a:lstStyle/>
                     <a:p>
                       <a:r>
-                        <a:rPr lang="en-US" b="1">
+                        <a:rPr lang="en-US" b="1" dirty="0" err="1">
                           <a:solidFill>
                             <a:schemeClr val="accent1"/>
                           </a:solidFill>
                           <a:latin typeface="Courier New" panose="02070309020205020404" pitchFamily="49" charset="0"/>
                           <a:cs typeface="Courier New" panose="02070309020205020404" pitchFamily="49" charset="0"/>
                         </a:rPr>
-                        <a:t>cc_trust_data </a:t>
+                        <a:t>cc_trust_manager</a:t>
+                      </a:r>
+                      <a:r>
+                        <a:rPr lang="en-US" b="1" dirty="0">
+                          <a:solidFill>
+                            <a:schemeClr val="accent1"/>
+                          </a:solidFill>
+                          <a:latin typeface="Courier New" panose="02070309020205020404" pitchFamily="49" charset="0"/>
+                          <a:cs typeface="Courier New" panose="02070309020205020404" pitchFamily="49" charset="0"/>
+                        </a:rPr>
+                        <a:t> </a:t>
                       </a:r>
                     </a:p>
                   </a:txBody>
@@ -26961,7 +26971,7 @@
                     <a:lstStyle/>
                     <a:p>
                       <a:r>
-                        <a:rPr lang="en-US"/>
+                        <a:rPr lang="en-US" dirty="0"/>
                         <a:t>Basic interface to establish keys, policy and manage certification with the certifier service.</a:t>
                       </a:r>
                     </a:p>
@@ -27528,7 +27538,16 @@
                 <a:effectLst/>
                 <a:latin typeface="Menlo" panose="020B0609030804020204" pitchFamily="49" charset="0"/>
               </a:rPr>
-              <a:t>cc_trust_data</a:t>
+              <a:t>cc_trust_</a:t>
+            </a:r>
+            <a:r>
+              <a:rPr lang="en-US" sz="1800" dirty="0" err="1">
+                <a:solidFill>
+                  <a:srgbClr val="4EC9B0"/>
+                </a:solidFill>
+                <a:latin typeface="Menlo" panose="020B0609030804020204" pitchFamily="49" charset="0"/>
+              </a:rPr>
+              <a:t>manager</a:t>
             </a:r>
             <a:r>
               <a:rPr lang="en-US" sz="1800" b="0" dirty="0">
@@ -27548,7 +27567,7 @@
                 <a:effectLst/>
                 <a:latin typeface="Menlo" panose="020B0609030804020204" pitchFamily="49" charset="0"/>
               </a:rPr>
-              <a:t>app_trust_data</a:t>
+              <a:t>trust_mgr</a:t>
             </a:r>
             <a:r>
               <a:rPr lang="en-US" sz="1800" b="0" dirty="0">
@@ -27684,7 +27703,7 @@
                 <a:effectLst/>
                 <a:latin typeface="Menlo" panose="020B0609030804020204" pitchFamily="49" charset="0"/>
               </a:rPr>
-              <a:t>app_trust_data</a:t>
+              <a:t>trust_mgr</a:t>
             </a:r>
             <a:r>
               <a:rPr lang="en-US" sz="1800" b="0" dirty="0" err="1">
@@ -27775,7 +27794,7 @@
                 <a:effectLst/>
                 <a:latin typeface="Menlo" panose="020B0609030804020204" pitchFamily="49" charset="0"/>
               </a:rPr>
-              <a:t>app_trust_data</a:t>
+              <a:t>trust_mgr</a:t>
             </a:r>
             <a:r>
               <a:rPr lang="en-US" sz="1800" b="0" dirty="0" err="1">
@@ -27857,7 +27876,7 @@
                 <a:effectLst/>
                 <a:latin typeface="Menlo" panose="020B0609030804020204" pitchFamily="49" charset="0"/>
               </a:rPr>
-              <a:t>app_trust_data</a:t>
+              <a:t>trust_mgr</a:t>
             </a:r>
             <a:r>
               <a:rPr lang="en-US" sz="1800" b="0" dirty="0" err="1">
@@ -27939,7 +27958,7 @@
                 <a:effectLst/>
                 <a:latin typeface="Menlo" panose="020B0609030804020204" pitchFamily="49" charset="0"/>
               </a:rPr>
-              <a:t>app_trust_data</a:t>
+              <a:t>trust_mgr</a:t>
             </a:r>
             <a:r>
               <a:rPr lang="en-US" sz="1800" b="0" dirty="0" err="1">
@@ -35027,15 +35046,6 @@
 </file>
 
 <file path=customXml/item1.xml><?xml version="1.0" encoding="utf-8"?>
-<?mso-contentType ?>
-<FormTemplates xmlns="http://schemas.microsoft.com/sharepoint/v3/contenttype/forms">
-  <Display>DocumentLibraryForm</Display>
-  <Edit>DocumentLibraryForm</Edit>
-  <New>DocumentLibraryForm</New>
-</FormTemplates>
-</file>
-
-<file path=customXml/item2.xml><?xml version="1.0" encoding="utf-8"?>
 <ct:contentTypeSchema xmlns:ct="http://schemas.microsoft.com/office/2006/metadata/contentType" xmlns:ma="http://schemas.microsoft.com/office/2006/metadata/properties/metaAttributes" ct:_="" ma:_="" ma:contentTypeName="Document" ma:contentTypeID="0x0101004315450B81DA7D4295FAB6E101FBB355" ma:contentTypeVersion="12" ma:contentTypeDescription="Create a new document." ma:contentTypeScope="" ma:versionID="84c08f737672de27f3fbef69a7b74bfc">
   <xsd:schema xmlns:xsd="http://www.w3.org/2001/XMLSchema" xmlns:xs="http://www.w3.org/2001/XMLSchema" xmlns:p="http://schemas.microsoft.com/office/2006/metadata/properties" xmlns:ns2="d31f2ad2-e472-44ee-9b91-cb098f6c1beb" xmlns:ns3="28481bb3-5299-45df-98e4-9eda10c473f6" targetNamespace="http://schemas.microsoft.com/office/2006/metadata/properties" ma:root="true" ma:fieldsID="2e699634b7f5100d9c3fe33ad11b8f85" ns2:_="" ns3:_="">
     <xsd:import namespace="d31f2ad2-e472-44ee-9b91-cb098f6c1beb"/>
@@ -35252,6 +35262,15 @@
 </ct:contentTypeSchema>
 </file>
 
+<file path=customXml/item2.xml><?xml version="1.0" encoding="utf-8"?>
+<?mso-contentType ?>
+<FormTemplates xmlns="http://schemas.microsoft.com/sharepoint/v3/contenttype/forms">
+  <Display>DocumentLibraryForm</Display>
+  <Edit>DocumentLibraryForm</Edit>
+  <New>DocumentLibraryForm</New>
+</FormTemplates>
+</file>
+
 <file path=customXml/item3.xml><?xml version="1.0" encoding="utf-8"?>
 <p:properties xmlns:p="http://schemas.microsoft.com/office/2006/metadata/properties" xmlns:xsi="http://www.w3.org/2001/XMLSchema-instance" xmlns:pc="http://schemas.microsoft.com/office/infopath/2007/PartnerControls">
   <documentManagement/>
@@ -35259,14 +35278,6 @@
 </file>
 
 <file path=customXml/itemProps1.xml><?xml version="1.0" encoding="utf-8"?>
-<ds:datastoreItem xmlns:ds="http://schemas.openxmlformats.org/officeDocument/2006/customXml" ds:itemID="{1264E9BF-81F6-4417-9AFD-A5CB4EDABBF6}">
-  <ds:schemaRefs>
-    <ds:schemaRef ds:uri="http://schemas.microsoft.com/sharepoint/v3/contenttype/forms"/>
-  </ds:schemaRefs>
-</ds:datastoreItem>
-</file>
-
-<file path=customXml/itemProps2.xml><?xml version="1.0" encoding="utf-8"?>
 <ds:datastoreItem xmlns:ds="http://schemas.openxmlformats.org/officeDocument/2006/customXml" ds:itemID="{8318C4A0-5E8F-4BD2-A274-9D4044649880}">
   <ds:schemaRefs>
     <ds:schemaRef ds:uri="28481bb3-5299-45df-98e4-9eda10c473f6"/>
@@ -35281,6 +35292,14 @@
     <ds:schemaRef ds:uri="http://schemas.microsoft.com/office/infopath/2007/PartnerControls"/>
     <ds:schemaRef ds:uri="http://schemas.openxmlformats.org/package/2006/metadata/core-properties"/>
     <ds:schemaRef ds:uri="http://www.w3.org/2001/XMLSchema"/>
+  </ds:schemaRefs>
+</ds:datastoreItem>
+</file>
+
+<file path=customXml/itemProps2.xml><?xml version="1.0" encoding="utf-8"?>
+<ds:datastoreItem xmlns:ds="http://schemas.openxmlformats.org/officeDocument/2006/customXml" ds:itemID="{1264E9BF-81F6-4417-9AFD-A5CB4EDABBF6}">
+  <ds:schemaRefs>
+    <ds:schemaRef ds:uri="http://schemas.microsoft.com/sharepoint/v3/contenttype/forms"/>
   </ds:schemaRefs>
 </ds:datastoreItem>
 </file>

</xml_diff>